<commit_message>
LC11 last changes before the show (I hope)
</commit_message>
<xml_diff>
--- a/Leçons/diapo/LC11.pptx
+++ b/Leçons/diapo/LC11.pptx
@@ -10,13 +10,12 @@
     <p:sldId id="262" r:id="rId4"/>
     <p:sldId id="260" r:id="rId5"/>
     <p:sldId id="264" r:id="rId6"/>
-    <p:sldId id="270" r:id="rId7"/>
-    <p:sldId id="263" r:id="rId8"/>
-    <p:sldId id="266" r:id="rId9"/>
-    <p:sldId id="265" r:id="rId10"/>
-    <p:sldId id="267" r:id="rId11"/>
-    <p:sldId id="268" r:id="rId12"/>
-    <p:sldId id="269" r:id="rId13"/>
+    <p:sldId id="263" r:id="rId7"/>
+    <p:sldId id="266" r:id="rId8"/>
+    <p:sldId id="265" r:id="rId9"/>
+    <p:sldId id="267" r:id="rId10"/>
+    <p:sldId id="268" r:id="rId11"/>
+    <p:sldId id="269" r:id="rId12"/>
   </p:sldIdLst>
   <p:sldSz cx="12192000" cy="6858000"/>
   <p:notesSz cx="6858000" cy="9144000"/>
@@ -3086,427 +3085,6 @@
 </file>
 
 <file path=ppt/slides/slide10.xml><?xml version="1.0" encoding="utf-8"?>
-<p:sld xmlns:a="http://schemas.openxmlformats.org/drawingml/2006/main" xmlns:r="http://schemas.openxmlformats.org/officeDocument/2006/relationships" xmlns:p="http://schemas.openxmlformats.org/presentationml/2006/main">
-  <p:cSld>
-    <p:spTree>
-      <p:nvGrpSpPr>
-        <p:cNvPr id="1" name=""/>
-        <p:cNvGrpSpPr/>
-        <p:nvPr/>
-      </p:nvGrpSpPr>
-      <p:grpSpPr>
-        <a:xfrm>
-          <a:off x="0" y="0"/>
-          <a:ext cx="0" cy="0"/>
-          <a:chOff x="0" y="0"/>
-          <a:chExt cx="0" cy="0"/>
-        </a:xfrm>
-      </p:grpSpPr>
-      <p:sp>
-        <p:nvSpPr>
-          <p:cNvPr id="4" name="Titre 1"/>
-          <p:cNvSpPr txBox="1">
-            <a:spLocks/>
-          </p:cNvSpPr>
-          <p:nvPr/>
-        </p:nvSpPr>
-        <p:spPr>
-          <a:xfrm>
-            <a:off x="0" y="0"/>
-            <a:ext cx="12192000" cy="747252"/>
-          </a:xfrm>
-          <a:prstGeom prst="rect">
-            <a:avLst/>
-          </a:prstGeom>
-        </p:spPr>
-        <p:txBody>
-          <a:bodyPr vert="horz" lIns="91440" tIns="45720" rIns="91440" bIns="45720" rtlCol="0" anchor="ctr">
-            <a:normAutofit/>
-          </a:bodyPr>
-          <a:lstStyle>
-            <a:lvl1pPr algn="l" defTabSz="914400" rtl="0" eaLnBrk="1" latinLnBrk="0" hangingPunct="1">
-              <a:lnSpc>
-                <a:spcPct val="90000"/>
-              </a:lnSpc>
-              <a:spcBef>
-                <a:spcPct val="0"/>
-              </a:spcBef>
-              <a:buNone/>
-              <a:defRPr sz="4400" kern="1200">
-                <a:solidFill>
-                  <a:schemeClr val="tx1"/>
-                </a:solidFill>
-                <a:latin typeface="+mj-lt"/>
-                <a:ea typeface="+mj-ea"/>
-                <a:cs typeface="+mj-cs"/>
-              </a:defRPr>
-            </a:lvl1pPr>
-          </a:lstStyle>
-          <a:p>
-            <a:r>
-              <a:rPr lang="fr-FR" sz="3600" b="1" dirty="0" smtClean="0">
-                <a:solidFill>
-                  <a:srgbClr val="0070C0"/>
-                </a:solidFill>
-              </a:rPr>
-              <a:t>  Synthèse du paracétamol – Montage</a:t>
-            </a:r>
-            <a:endParaRPr lang="fr-FR" sz="3600" dirty="0">
-              <a:solidFill>
-                <a:srgbClr val="0070C0"/>
-              </a:solidFill>
-            </a:endParaRPr>
-          </a:p>
-        </p:txBody>
-      </p:sp>
-      <p:cxnSp>
-        <p:nvCxnSpPr>
-          <p:cNvPr id="5" name="Connecteur droit 4"/>
-          <p:cNvCxnSpPr/>
-          <p:nvPr/>
-        </p:nvCxnSpPr>
-        <p:spPr>
-          <a:xfrm>
-            <a:off x="220983" y="747252"/>
-            <a:ext cx="11754707" cy="0"/>
-          </a:xfrm>
-          <a:prstGeom prst="line">
-            <a:avLst/>
-          </a:prstGeom>
-          <a:ln w="76200">
-            <a:gradFill flip="none" rotWithShape="1">
-              <a:gsLst>
-                <a:gs pos="0">
-                  <a:srgbClr val="0070C0"/>
-                </a:gs>
-                <a:gs pos="100000">
-                  <a:srgbClr val="0070C0">
-                    <a:alpha val="25000"/>
-                  </a:srgbClr>
-                </a:gs>
-              </a:gsLst>
-              <a:lin ang="0" scaled="1"/>
-              <a:tileRect/>
-            </a:gradFill>
-          </a:ln>
-        </p:spPr>
-        <p:style>
-          <a:lnRef idx="1">
-            <a:schemeClr val="accent1"/>
-          </a:lnRef>
-          <a:fillRef idx="0">
-            <a:schemeClr val="accent1"/>
-          </a:fillRef>
-          <a:effectRef idx="0">
-            <a:schemeClr val="accent1"/>
-          </a:effectRef>
-          <a:fontRef idx="minor">
-            <a:schemeClr val="tx1"/>
-          </a:fontRef>
-        </p:style>
-      </p:cxnSp>
-      <p:grpSp>
-        <p:nvGrpSpPr>
-          <p:cNvPr id="3" name="Groupe 2"/>
-          <p:cNvGrpSpPr/>
-          <p:nvPr/>
-        </p:nvGrpSpPr>
-        <p:grpSpPr>
-          <a:xfrm>
-            <a:off x="220982" y="990072"/>
-            <a:ext cx="6562846" cy="5058137"/>
-            <a:chOff x="2814577" y="1203767"/>
-            <a:chExt cx="6562846" cy="5058137"/>
-          </a:xfrm>
-        </p:grpSpPr>
-        <p:pic>
-          <p:nvPicPr>
-            <p:cNvPr id="20" name="Image 19"/>
-            <p:cNvPicPr>
-              <a:picLocks noChangeAspect="1"/>
-            </p:cNvPicPr>
-            <p:nvPr/>
-          </p:nvPicPr>
-          <p:blipFill rotWithShape="1">
-            <a:blip r:embed="rId2"/>
-            <a:srcRect l="22404" t="17385" r="23766" b="8860"/>
-            <a:stretch/>
-          </p:blipFill>
-          <p:spPr>
-            <a:xfrm>
-              <a:off x="2814577" y="1203767"/>
-              <a:ext cx="6562846" cy="5058137"/>
-            </a:xfrm>
-            <a:prstGeom prst="rect">
-              <a:avLst/>
-            </a:prstGeom>
-          </p:spPr>
-        </p:pic>
-        <p:sp>
-          <p:nvSpPr>
-            <p:cNvPr id="2" name="Rectangle 1"/>
-            <p:cNvSpPr/>
-            <p:nvPr/>
-          </p:nvSpPr>
-          <p:spPr>
-            <a:xfrm>
-              <a:off x="6991109" y="1203767"/>
-              <a:ext cx="2386314" cy="2187616"/>
-            </a:xfrm>
-            <a:prstGeom prst="rect">
-              <a:avLst/>
-            </a:prstGeom>
-            <a:solidFill>
-              <a:schemeClr val="bg1"/>
-            </a:solidFill>
-            <a:ln>
-              <a:noFill/>
-            </a:ln>
-          </p:spPr>
-          <p:style>
-            <a:lnRef idx="2">
-              <a:schemeClr val="accent1">
-                <a:shade val="50000"/>
-              </a:schemeClr>
-            </a:lnRef>
-            <a:fillRef idx="1">
-              <a:schemeClr val="accent1"/>
-            </a:fillRef>
-            <a:effectRef idx="0">
-              <a:schemeClr val="accent1"/>
-            </a:effectRef>
-            <a:fontRef idx="minor">
-              <a:schemeClr val="lt1"/>
-            </a:fontRef>
-          </p:style>
-          <p:txBody>
-            <a:bodyPr rtlCol="0" anchor="ctr"/>
-            <a:lstStyle/>
-            <a:p>
-              <a:pPr algn="ctr"/>
-              <a:endParaRPr lang="fr-FR"/>
-            </a:p>
-          </p:txBody>
-        </p:sp>
-      </p:grpSp>
-      <p:pic>
-        <p:nvPicPr>
-          <p:cNvPr id="6" name="Image 5"/>
-          <p:cNvPicPr>
-            <a:picLocks noChangeAspect="1"/>
-          </p:cNvPicPr>
-          <p:nvPr/>
-        </p:nvPicPr>
-        <p:blipFill rotWithShape="1">
-          <a:blip r:embed="rId3"/>
-          <a:srcRect l="15570" t="12489" r="51581" b="5822"/>
-          <a:stretch/>
-        </p:blipFill>
-        <p:spPr>
-          <a:xfrm>
-            <a:off x="8777609" y="1574593"/>
-            <a:ext cx="3198081" cy="4473616"/>
-          </a:xfrm>
-          <a:prstGeom prst="rect">
-            <a:avLst/>
-          </a:prstGeom>
-        </p:spPr>
-      </p:pic>
-      <p:sp>
-        <p:nvSpPr>
-          <p:cNvPr id="21" name="Rectangle 20"/>
-          <p:cNvSpPr/>
-          <p:nvPr/>
-        </p:nvSpPr>
-        <p:spPr>
-          <a:xfrm>
-            <a:off x="1657496" y="6291031"/>
-            <a:ext cx="3689819" cy="523220"/>
-          </a:xfrm>
-          <a:prstGeom prst="rect">
-            <a:avLst/>
-          </a:prstGeom>
-        </p:spPr>
-        <p:txBody>
-          <a:bodyPr wrap="square">
-            <a:spAutoFit/>
-          </a:bodyPr>
-          <a:lstStyle/>
-          <a:p>
-            <a:pPr algn="ctr"/>
-            <a:r>
-              <a:rPr lang="fr-FR" sz="2800" dirty="0" smtClean="0">
-                <a:solidFill>
-                  <a:schemeClr val="accent2"/>
-                </a:solidFill>
-              </a:rPr>
-              <a:t>Chauffage à reflux</a:t>
-            </a:r>
-            <a:endParaRPr lang="fr-FR" sz="2800" dirty="0">
-              <a:solidFill>
-                <a:schemeClr val="accent2"/>
-              </a:solidFill>
-            </a:endParaRPr>
-          </a:p>
-        </p:txBody>
-      </p:sp>
-      <p:sp>
-        <p:nvSpPr>
-          <p:cNvPr id="22" name="Rectangle 21"/>
-          <p:cNvSpPr/>
-          <p:nvPr/>
-        </p:nvSpPr>
-        <p:spPr>
-          <a:xfrm>
-            <a:off x="8531739" y="6291031"/>
-            <a:ext cx="3689819" cy="523220"/>
-          </a:xfrm>
-          <a:prstGeom prst="rect">
-            <a:avLst/>
-          </a:prstGeom>
-        </p:spPr>
-        <p:txBody>
-          <a:bodyPr wrap="square">
-            <a:spAutoFit/>
-          </a:bodyPr>
-          <a:lstStyle/>
-          <a:p>
-            <a:pPr algn="ctr"/>
-            <a:r>
-              <a:rPr lang="fr-FR" sz="2800" dirty="0" smtClean="0">
-                <a:solidFill>
-                  <a:schemeClr val="accent2"/>
-                </a:solidFill>
-              </a:rPr>
-              <a:t>Filtrage sous vide</a:t>
-            </a:r>
-            <a:endParaRPr lang="fr-FR" sz="2800" dirty="0">
-              <a:solidFill>
-                <a:schemeClr val="accent2"/>
-              </a:solidFill>
-            </a:endParaRPr>
-          </a:p>
-        </p:txBody>
-      </p:sp>
-    </p:spTree>
-    <p:extLst>
-      <p:ext uri="{BB962C8B-B14F-4D97-AF65-F5344CB8AC3E}">
-        <p14:creationId xmlns:p14="http://schemas.microsoft.com/office/powerpoint/2010/main" val="667187494"/>
-      </p:ext>
-    </p:extLst>
-  </p:cSld>
-  <p:clrMapOvr>
-    <a:masterClrMapping/>
-  </p:clrMapOvr>
-  <p:timing>
-    <p:tnLst>
-      <p:par>
-        <p:cTn id="1" dur="indefinite" restart="never" nodeType="tmRoot">
-          <p:childTnLst>
-            <p:seq concurrent="1" nextAc="seek">
-              <p:cTn id="2" dur="indefinite" nodeType="mainSeq">
-                <p:childTnLst>
-                  <p:par>
-                    <p:cTn id="3" fill="hold">
-                      <p:stCondLst>
-                        <p:cond delay="indefinite"/>
-                      </p:stCondLst>
-                      <p:childTnLst>
-                        <p:par>
-                          <p:cTn id="4" fill="hold">
-                            <p:stCondLst>
-                              <p:cond delay="0"/>
-                            </p:stCondLst>
-                            <p:childTnLst>
-                              <p:par>
-                                <p:cTn id="5" presetID="1" presetClass="entr" presetSubtype="0" fill="hold" nodeType="clickEffect">
-                                  <p:stCondLst>
-                                    <p:cond delay="0"/>
-                                  </p:stCondLst>
-                                  <p:childTnLst>
-                                    <p:set>
-                                      <p:cBhvr>
-                                        <p:cTn id="6" dur="1" fill="hold">
-                                          <p:stCondLst>
-                                            <p:cond delay="0"/>
-                                          </p:stCondLst>
-                                        </p:cTn>
-                                        <p:tgtEl>
-                                          <p:spTgt spid="6"/>
-                                        </p:tgtEl>
-                                        <p:attrNameLst>
-                                          <p:attrName>style.visibility</p:attrName>
-                                        </p:attrNameLst>
-                                      </p:cBhvr>
-                                      <p:to>
-                                        <p:strVal val="visible"/>
-                                      </p:to>
-                                    </p:set>
-                                  </p:childTnLst>
-                                </p:cTn>
-                              </p:par>
-                              <p:par>
-                                <p:cTn id="7" presetID="1" presetClass="entr" presetSubtype="0" fill="hold" grpId="0" nodeType="withEffect">
-                                  <p:stCondLst>
-                                    <p:cond delay="0"/>
-                                  </p:stCondLst>
-                                  <p:childTnLst>
-                                    <p:set>
-                                      <p:cBhvr>
-                                        <p:cTn id="8" dur="1" fill="hold">
-                                          <p:stCondLst>
-                                            <p:cond delay="0"/>
-                                          </p:stCondLst>
-                                        </p:cTn>
-                                        <p:tgtEl>
-                                          <p:spTgt spid="22"/>
-                                        </p:tgtEl>
-                                        <p:attrNameLst>
-                                          <p:attrName>style.visibility</p:attrName>
-                                        </p:attrNameLst>
-                                      </p:cBhvr>
-                                      <p:to>
-                                        <p:strVal val="visible"/>
-                                      </p:to>
-                                    </p:set>
-                                  </p:childTnLst>
-                                </p:cTn>
-                              </p:par>
-                            </p:childTnLst>
-                          </p:cTn>
-                        </p:par>
-                      </p:childTnLst>
-                    </p:cTn>
-                  </p:par>
-                </p:childTnLst>
-              </p:cTn>
-              <p:prevCondLst>
-                <p:cond evt="onPrev" delay="0">
-                  <p:tgtEl>
-                    <p:sldTgt/>
-                  </p:tgtEl>
-                </p:cond>
-              </p:prevCondLst>
-              <p:nextCondLst>
-                <p:cond evt="onNext" delay="0">
-                  <p:tgtEl>
-                    <p:sldTgt/>
-                  </p:tgtEl>
-                </p:cond>
-              </p:nextCondLst>
-            </p:seq>
-          </p:childTnLst>
-        </p:cTn>
-      </p:par>
-    </p:tnLst>
-    <p:bldLst>
-      <p:bldP spid="22" grpId="0"/>
-    </p:bldLst>
-  </p:timing>
-</p:sld>
-</file>
-
-<file path=ppt/slides/slide11.xml><?xml version="1.0" encoding="utf-8"?>
 <p:sld xmlns:a="http://schemas.openxmlformats.org/drawingml/2006/main" xmlns:r="http://schemas.openxmlformats.org/officeDocument/2006/relationships" xmlns:p="http://schemas.openxmlformats.org/presentationml/2006/main">
   <p:cSld>
     <p:spTree>
@@ -5370,7 +4948,7 @@
 </p:sld>
 </file>
 
-<file path=ppt/slides/slide12.xml><?xml version="1.0" encoding="utf-8"?>
+<file path=ppt/slides/slide11.xml><?xml version="1.0" encoding="utf-8"?>
 <p:sld xmlns:a="http://schemas.openxmlformats.org/drawingml/2006/main" xmlns:r="http://schemas.openxmlformats.org/officeDocument/2006/relationships" xmlns:p="http://schemas.openxmlformats.org/presentationml/2006/main">
   <p:cSld>
     <p:spTree>
@@ -5434,15 +5012,7 @@
                   <a:srgbClr val="0070C0"/>
                 </a:solidFill>
               </a:rPr>
-              <a:t>  </a:t>
-            </a:r>
-            <a:r>
-              <a:rPr lang="fr-FR" sz="3600" b="1" dirty="0" smtClean="0">
-                <a:solidFill>
-                  <a:srgbClr val="0070C0"/>
-                </a:solidFill>
-              </a:rPr>
-              <a:t>La chimie au service de la santé</a:t>
+              <a:t>  La chimie au service de la santé</a:t>
             </a:r>
             <a:endParaRPr lang="fr-FR" sz="3600" dirty="0">
               <a:solidFill>
@@ -7491,186 +7061,14 @@
             <a:r>
               <a:rPr lang="fr-FR" sz="3600" b="1" dirty="0" smtClean="0">
                 <a:solidFill>
-                  <a:srgbClr val="0070C0"/>
+                  <a:schemeClr val="accent5"/>
                 </a:solidFill>
               </a:rPr>
-              <a:t>  </a:t>
-            </a:r>
-            <a:r>
-              <a:rPr lang="fr-FR" sz="3600" b="1" dirty="0" smtClean="0">
-                <a:solidFill>
-                  <a:srgbClr val="0070C0"/>
-                </a:solidFill>
-              </a:rPr>
-              <a:t>Différentes </a:t>
-            </a:r>
-            <a:r>
-              <a:rPr lang="fr-FR" sz="3600" b="1" smtClean="0">
-                <a:solidFill>
-                  <a:srgbClr val="0070C0"/>
-                </a:solidFill>
-              </a:rPr>
-              <a:t>méthodes d’extraction</a:t>
+              <a:t>  De multiples méthodes d’extraction</a:t>
             </a:r>
             <a:endParaRPr lang="fr-FR" sz="3600" dirty="0">
               <a:solidFill>
-                <a:srgbClr val="0070C0"/>
-              </a:solidFill>
-            </a:endParaRPr>
-          </a:p>
-        </p:txBody>
-      </p:sp>
-      <p:cxnSp>
-        <p:nvCxnSpPr>
-          <p:cNvPr id="5" name="Connecteur droit 4"/>
-          <p:cNvCxnSpPr/>
-          <p:nvPr/>
-        </p:nvCxnSpPr>
-        <p:spPr>
-          <a:xfrm>
-            <a:off x="220983" y="747252"/>
-            <a:ext cx="11754707" cy="0"/>
-          </a:xfrm>
-          <a:prstGeom prst="line">
-            <a:avLst/>
-          </a:prstGeom>
-          <a:ln w="76200">
-            <a:gradFill flip="none" rotWithShape="1">
-              <a:gsLst>
-                <a:gs pos="0">
-                  <a:srgbClr val="0070C0"/>
-                </a:gs>
-                <a:gs pos="100000">
-                  <a:srgbClr val="0070C0">
-                    <a:alpha val="25000"/>
-                  </a:srgbClr>
-                </a:gs>
-              </a:gsLst>
-              <a:lin ang="0" scaled="1"/>
-              <a:tileRect/>
-            </a:gradFill>
-          </a:ln>
-        </p:spPr>
-        <p:style>
-          <a:lnRef idx="1">
-            <a:schemeClr val="accent1"/>
-          </a:lnRef>
-          <a:fillRef idx="0">
-            <a:schemeClr val="accent1"/>
-          </a:fillRef>
-          <a:effectRef idx="0">
-            <a:schemeClr val="accent1"/>
-          </a:effectRef>
-          <a:fontRef idx="minor">
-            <a:schemeClr val="tx1"/>
-          </a:fontRef>
-        </p:style>
-      </p:cxnSp>
-    </p:spTree>
-    <p:extLst>
-      <p:ext uri="{BB962C8B-B14F-4D97-AF65-F5344CB8AC3E}">
-        <p14:creationId xmlns:p14="http://schemas.microsoft.com/office/powerpoint/2010/main" val="1575509300"/>
-      </p:ext>
-    </p:extLst>
-  </p:cSld>
-  <p:clrMapOvr>
-    <a:masterClrMapping/>
-  </p:clrMapOvr>
-  <p:timing>
-    <p:tnLst>
-      <p:par>
-        <p:cTn id="1" dur="indefinite" restart="never" nodeType="tmRoot"/>
-      </p:par>
-    </p:tnLst>
-  </p:timing>
-</p:sld>
-</file>
-
-<file path=ppt/slides/slide7.xml><?xml version="1.0" encoding="utf-8"?>
-<p:sld xmlns:a="http://schemas.openxmlformats.org/drawingml/2006/main" xmlns:r="http://schemas.openxmlformats.org/officeDocument/2006/relationships" xmlns:p="http://schemas.openxmlformats.org/presentationml/2006/main">
-  <p:cSld>
-    <p:spTree>
-      <p:nvGrpSpPr>
-        <p:cNvPr id="1" name=""/>
-        <p:cNvGrpSpPr/>
-        <p:nvPr/>
-      </p:nvGrpSpPr>
-      <p:grpSpPr>
-        <a:xfrm>
-          <a:off x="0" y="0"/>
-          <a:ext cx="0" cy="0"/>
-          <a:chOff x="0" y="0"/>
-          <a:chExt cx="0" cy="0"/>
-        </a:xfrm>
-      </p:grpSpPr>
-      <p:sp>
-        <p:nvSpPr>
-          <p:cNvPr id="4" name="Titre 1"/>
-          <p:cNvSpPr txBox="1">
-            <a:spLocks/>
-          </p:cNvSpPr>
-          <p:nvPr/>
-        </p:nvSpPr>
-        <p:spPr>
-          <a:xfrm>
-            <a:off x="0" y="0"/>
-            <a:ext cx="12192000" cy="747252"/>
-          </a:xfrm>
-          <a:prstGeom prst="rect">
-            <a:avLst/>
-          </a:prstGeom>
-        </p:spPr>
-        <p:txBody>
-          <a:bodyPr vert="horz" lIns="91440" tIns="45720" rIns="91440" bIns="45720" rtlCol="0" anchor="ctr">
-            <a:normAutofit/>
-          </a:bodyPr>
-          <a:lstStyle>
-            <a:lvl1pPr algn="l" defTabSz="914400" rtl="0" eaLnBrk="1" latinLnBrk="0" hangingPunct="1">
-              <a:lnSpc>
-                <a:spcPct val="90000"/>
-              </a:lnSpc>
-              <a:spcBef>
-                <a:spcPct val="0"/>
-              </a:spcBef>
-              <a:buNone/>
-              <a:defRPr sz="4400" kern="1200">
-                <a:solidFill>
-                  <a:schemeClr val="tx1"/>
-                </a:solidFill>
-                <a:latin typeface="+mj-lt"/>
-                <a:ea typeface="+mj-ea"/>
-                <a:cs typeface="+mj-cs"/>
-              </a:defRPr>
-            </a:lvl1pPr>
-          </a:lstStyle>
-          <a:p>
-            <a:r>
-              <a:rPr lang="fr-FR" sz="3600" b="1" dirty="0" smtClean="0">
-                <a:solidFill>
-                  <a:srgbClr val="0070C0"/>
-                </a:solidFill>
-              </a:rPr>
-              <a:t>  </a:t>
-            </a:r>
-            <a:r>
-              <a:rPr lang="fr-FR" sz="3600" b="1" dirty="0" err="1" smtClean="0">
-                <a:solidFill>
-                  <a:srgbClr val="0070C0"/>
-                </a:solidFill>
-              </a:rPr>
-              <a:t>Hydrodistillation</a:t>
-            </a:r>
-            <a:r>
-              <a:rPr lang="fr-FR" sz="3600" b="1" dirty="0" smtClean="0">
-                <a:solidFill>
-                  <a:srgbClr val="0070C0"/>
-                </a:solidFill>
-              </a:rPr>
-              <a:t> de la lavande </a:t>
-            </a:r>
-            <a:endParaRPr lang="fr-FR" sz="3600" dirty="0">
-              <a:solidFill>
-                <a:srgbClr val="0070C0"/>
+                <a:schemeClr val="accent5"/>
               </a:solidFill>
             </a:endParaRPr>
           </a:p>
@@ -7744,8 +7142,8 @@
         </p:blipFill>
         <p:spPr>
           <a:xfrm>
-            <a:off x="7265242" y="914398"/>
-            <a:ext cx="4710448" cy="3518705"/>
+            <a:off x="5520847" y="4200808"/>
+            <a:ext cx="3425879" cy="2559132"/>
           </a:xfrm>
           <a:prstGeom prst="rect">
             <a:avLst/>
@@ -7774,8 +7172,8 @@
         </p:blipFill>
         <p:spPr>
           <a:xfrm>
-            <a:off x="220983" y="914399"/>
-            <a:ext cx="6641104" cy="3518705"/>
+            <a:off x="220983" y="4200808"/>
+            <a:ext cx="4830034" cy="2559132"/>
           </a:xfrm>
           <a:prstGeom prst="rect">
             <a:avLst/>
@@ -7804,8 +7202,8 @@
         </p:blipFill>
         <p:spPr>
           <a:xfrm>
-            <a:off x="5143500" y="4745138"/>
-            <a:ext cx="1905000" cy="1905000"/>
+            <a:off x="9416557" y="4200807"/>
+            <a:ext cx="2559133" cy="2559133"/>
           </a:xfrm>
           <a:prstGeom prst="rect">
             <a:avLst/>
@@ -7819,6 +7217,280 @@
           </a:effectLst>
         </p:spPr>
       </p:pic>
+      <p:pic>
+        <p:nvPicPr>
+          <p:cNvPr id="2" name="Image 1"/>
+          <p:cNvPicPr>
+            <a:picLocks noChangeAspect="1"/>
+          </p:cNvPicPr>
+          <p:nvPr/>
+        </p:nvPicPr>
+        <p:blipFill>
+          <a:blip r:embed="rId5" cstate="print">
+            <a:extLst>
+              <a:ext uri="{28A0092B-C50C-407E-A947-70E740481C1C}">
+                <a14:useLocalDpi xmlns:a14="http://schemas.microsoft.com/office/drawing/2010/main" val="0"/>
+              </a:ext>
+            </a:extLst>
+          </a:blip>
+          <a:stretch>
+            <a:fillRect/>
+          </a:stretch>
+        </p:blipFill>
+        <p:spPr>
+          <a:xfrm>
+            <a:off x="4780249" y="833333"/>
+            <a:ext cx="2636177" cy="2557092"/>
+          </a:xfrm>
+          <a:prstGeom prst="rect">
+            <a:avLst/>
+          </a:prstGeom>
+          <a:effectLst>
+            <a:outerShdw blurRad="50800" dist="38100" dir="2700000" algn="tl" rotWithShape="0">
+              <a:prstClr val="black">
+                <a:alpha val="40000"/>
+              </a:prstClr>
+            </a:outerShdw>
+          </a:effectLst>
+        </p:spPr>
+      </p:pic>
+      <p:pic>
+        <p:nvPicPr>
+          <p:cNvPr id="6" name="Image 5"/>
+          <p:cNvPicPr>
+            <a:picLocks noChangeAspect="1"/>
+          </p:cNvPicPr>
+          <p:nvPr/>
+        </p:nvPicPr>
+        <p:blipFill>
+          <a:blip r:embed="rId6" cstate="print">
+            <a:extLst>
+              <a:ext uri="{28A0092B-C50C-407E-A947-70E740481C1C}">
+                <a14:useLocalDpi xmlns:a14="http://schemas.microsoft.com/office/drawing/2010/main" val="0"/>
+              </a:ext>
+            </a:extLst>
+          </a:blip>
+          <a:stretch>
+            <a:fillRect/>
+          </a:stretch>
+        </p:blipFill>
+        <p:spPr>
+          <a:xfrm>
+            <a:off x="8566234" y="833332"/>
+            <a:ext cx="3409456" cy="2557093"/>
+          </a:xfrm>
+          <a:prstGeom prst="rect">
+            <a:avLst/>
+          </a:prstGeom>
+          <a:effectLst>
+            <a:outerShdw blurRad="50800" dist="38100" dir="2700000" algn="tl" rotWithShape="0">
+              <a:prstClr val="black">
+                <a:alpha val="40000"/>
+              </a:prstClr>
+            </a:outerShdw>
+          </a:effectLst>
+        </p:spPr>
+      </p:pic>
+      <p:pic>
+        <p:nvPicPr>
+          <p:cNvPr id="9" name="Image 8"/>
+          <p:cNvPicPr>
+            <a:picLocks noChangeAspect="1"/>
+          </p:cNvPicPr>
+          <p:nvPr/>
+        </p:nvPicPr>
+        <p:blipFill>
+          <a:blip r:embed="rId7" cstate="print">
+            <a:extLst>
+              <a:ext uri="{28A0092B-C50C-407E-A947-70E740481C1C}">
+                <a14:useLocalDpi xmlns:a14="http://schemas.microsoft.com/office/drawing/2010/main" val="0"/>
+              </a:ext>
+            </a:extLst>
+          </a:blip>
+          <a:stretch>
+            <a:fillRect/>
+          </a:stretch>
+        </p:blipFill>
+        <p:spPr>
+          <a:xfrm>
+            <a:off x="220983" y="833331"/>
+            <a:ext cx="3409458" cy="2557094"/>
+          </a:xfrm>
+          <a:prstGeom prst="rect">
+            <a:avLst/>
+          </a:prstGeom>
+          <a:effectLst>
+            <a:outerShdw blurRad="50800" dist="38100" dir="2700000" algn="tl" rotWithShape="0">
+              <a:prstClr val="black">
+                <a:alpha val="40000"/>
+              </a:prstClr>
+            </a:outerShdw>
+          </a:effectLst>
+        </p:spPr>
+      </p:pic>
+      <p:sp>
+        <p:nvSpPr>
+          <p:cNvPr id="10" name="Rectangle 9"/>
+          <p:cNvSpPr/>
+          <p:nvPr/>
+        </p:nvSpPr>
+        <p:spPr>
+          <a:xfrm>
+            <a:off x="1774479" y="2928760"/>
+            <a:ext cx="1855962" cy="461665"/>
+          </a:xfrm>
+          <a:prstGeom prst="rect">
+            <a:avLst/>
+          </a:prstGeom>
+        </p:spPr>
+        <p:txBody>
+          <a:bodyPr wrap="square">
+            <a:spAutoFit/>
+          </a:bodyPr>
+          <a:lstStyle/>
+          <a:p>
+            <a:pPr algn="r"/>
+            <a:r>
+              <a:rPr lang="fr-FR" sz="2400" i="1" dirty="0" smtClean="0">
+                <a:solidFill>
+                  <a:schemeClr val="bg2"/>
+                </a:solidFill>
+              </a:rPr>
+              <a:t>Expression</a:t>
+            </a:r>
+            <a:endParaRPr lang="fr-FR" sz="2400" i="1" dirty="0">
+              <a:solidFill>
+                <a:schemeClr val="bg2"/>
+              </a:solidFill>
+            </a:endParaRPr>
+          </a:p>
+        </p:txBody>
+      </p:sp>
+      <p:sp>
+        <p:nvSpPr>
+          <p:cNvPr id="11" name="Rectangle 10"/>
+          <p:cNvSpPr/>
+          <p:nvPr/>
+        </p:nvSpPr>
+        <p:spPr>
+          <a:xfrm>
+            <a:off x="5560464" y="2928760"/>
+            <a:ext cx="1855962" cy="461665"/>
+          </a:xfrm>
+          <a:prstGeom prst="rect">
+            <a:avLst/>
+          </a:prstGeom>
+        </p:spPr>
+        <p:txBody>
+          <a:bodyPr wrap="square">
+            <a:spAutoFit/>
+          </a:bodyPr>
+          <a:lstStyle/>
+          <a:p>
+            <a:pPr algn="r"/>
+            <a:r>
+              <a:rPr lang="fr-FR" sz="2400" i="1" dirty="0" smtClean="0">
+                <a:solidFill>
+                  <a:schemeClr val="bg2">
+                    <a:lumMod val="10000"/>
+                  </a:schemeClr>
+                </a:solidFill>
+              </a:rPr>
+              <a:t>Infusion</a:t>
+            </a:r>
+            <a:endParaRPr lang="fr-FR" sz="2400" i="1" dirty="0">
+              <a:solidFill>
+                <a:schemeClr val="bg2">
+                  <a:lumMod val="10000"/>
+                </a:schemeClr>
+              </a:solidFill>
+            </a:endParaRPr>
+          </a:p>
+        </p:txBody>
+      </p:sp>
+      <p:sp>
+        <p:nvSpPr>
+          <p:cNvPr id="12" name="Rectangle 11"/>
+          <p:cNvSpPr/>
+          <p:nvPr/>
+        </p:nvSpPr>
+        <p:spPr>
+          <a:xfrm>
+            <a:off x="10119728" y="2928760"/>
+            <a:ext cx="1855962" cy="461665"/>
+          </a:xfrm>
+          <a:prstGeom prst="rect">
+            <a:avLst/>
+          </a:prstGeom>
+        </p:spPr>
+        <p:txBody>
+          <a:bodyPr wrap="square">
+            <a:spAutoFit/>
+          </a:bodyPr>
+          <a:lstStyle/>
+          <a:p>
+            <a:pPr algn="r"/>
+            <a:r>
+              <a:rPr lang="fr-FR" sz="2400" i="1" dirty="0" smtClean="0">
+                <a:solidFill>
+                  <a:schemeClr val="accent2"/>
+                </a:solidFill>
+              </a:rPr>
+              <a:t>Macération</a:t>
+            </a:r>
+            <a:endParaRPr lang="fr-FR" sz="2400" i="1" dirty="0">
+              <a:solidFill>
+                <a:schemeClr val="accent2"/>
+              </a:solidFill>
+            </a:endParaRPr>
+          </a:p>
+        </p:txBody>
+      </p:sp>
+      <p:sp>
+        <p:nvSpPr>
+          <p:cNvPr id="13" name="Rectangle 12"/>
+          <p:cNvSpPr/>
+          <p:nvPr/>
+        </p:nvSpPr>
+        <p:spPr>
+          <a:xfrm>
+            <a:off x="218646" y="3677587"/>
+            <a:ext cx="11754707" cy="523220"/>
+          </a:xfrm>
+          <a:prstGeom prst="rect">
+            <a:avLst/>
+          </a:prstGeom>
+        </p:spPr>
+        <p:txBody>
+          <a:bodyPr wrap="square">
+            <a:spAutoFit/>
+          </a:bodyPr>
+          <a:lstStyle/>
+          <a:p>
+            <a:r>
+              <a:rPr lang="fr-FR" sz="2800" dirty="0" err="1" smtClean="0">
+                <a:solidFill>
+                  <a:schemeClr val="accent5"/>
+                </a:solidFill>
+              </a:rPr>
+              <a:t>Hydrodistillation</a:t>
+            </a:r>
+            <a:r>
+              <a:rPr lang="fr-FR" sz="2800" dirty="0" smtClean="0">
+                <a:solidFill>
+                  <a:schemeClr val="accent5"/>
+                </a:solidFill>
+              </a:rPr>
+              <a:t> de la lavande</a:t>
+            </a:r>
+            <a:endParaRPr lang="fr-FR" sz="2800" dirty="0">
+              <a:solidFill>
+                <a:schemeClr val="accent5"/>
+              </a:solidFill>
+            </a:endParaRPr>
+          </a:p>
+        </p:txBody>
+      </p:sp>
     </p:spTree>
     <p:extLst>
       <p:ext uri="{BB962C8B-B14F-4D97-AF65-F5344CB8AC3E}">
@@ -7832,14 +7504,166 @@
   <p:timing>
     <p:tnLst>
       <p:par>
-        <p:cTn id="1" dur="indefinite" restart="never" nodeType="tmRoot"/>
+        <p:cTn id="1" dur="indefinite" restart="never" nodeType="tmRoot">
+          <p:childTnLst>
+            <p:seq concurrent="1" nextAc="seek">
+              <p:cTn id="2" dur="indefinite" nodeType="mainSeq">
+                <p:childTnLst>
+                  <p:par>
+                    <p:cTn id="3" fill="hold">
+                      <p:stCondLst>
+                        <p:cond delay="indefinite"/>
+                      </p:stCondLst>
+                      <p:childTnLst>
+                        <p:par>
+                          <p:cTn id="4" fill="hold">
+                            <p:stCondLst>
+                              <p:cond delay="0"/>
+                            </p:stCondLst>
+                            <p:childTnLst>
+                              <p:par>
+                                <p:cTn id="5" presetID="1" presetClass="entr" presetSubtype="0" fill="hold" nodeType="clickEffect">
+                                  <p:stCondLst>
+                                    <p:cond delay="0"/>
+                                  </p:stCondLst>
+                                  <p:childTnLst>
+                                    <p:set>
+                                      <p:cBhvr>
+                                        <p:cTn id="6" dur="1" fill="hold">
+                                          <p:stCondLst>
+                                            <p:cond delay="0"/>
+                                          </p:stCondLst>
+                                        </p:cTn>
+                                        <p:tgtEl>
+                                          <p:spTgt spid="7"/>
+                                        </p:tgtEl>
+                                        <p:attrNameLst>
+                                          <p:attrName>style.visibility</p:attrName>
+                                        </p:attrNameLst>
+                                      </p:cBhvr>
+                                      <p:to>
+                                        <p:strVal val="visible"/>
+                                      </p:to>
+                                    </p:set>
+                                  </p:childTnLst>
+                                </p:cTn>
+                              </p:par>
+                              <p:par>
+                                <p:cTn id="7" presetID="1" presetClass="entr" presetSubtype="0" fill="hold" nodeType="withEffect">
+                                  <p:stCondLst>
+                                    <p:cond delay="0"/>
+                                  </p:stCondLst>
+                                  <p:childTnLst>
+                                    <p:set>
+                                      <p:cBhvr>
+                                        <p:cTn id="8" dur="1" fill="hold">
+                                          <p:stCondLst>
+                                            <p:cond delay="0"/>
+                                          </p:stCondLst>
+                                        </p:cTn>
+                                        <p:tgtEl>
+                                          <p:spTgt spid="3"/>
+                                        </p:tgtEl>
+                                        <p:attrNameLst>
+                                          <p:attrName>style.visibility</p:attrName>
+                                        </p:attrNameLst>
+                                      </p:cBhvr>
+                                      <p:to>
+                                        <p:strVal val="visible"/>
+                                      </p:to>
+                                    </p:set>
+                                  </p:childTnLst>
+                                </p:cTn>
+                              </p:par>
+                              <p:par>
+                                <p:cTn id="9" presetID="1" presetClass="entr" presetSubtype="0" fill="hold" nodeType="withEffect">
+                                  <p:stCondLst>
+                                    <p:cond delay="0"/>
+                                  </p:stCondLst>
+                                  <p:childTnLst>
+                                    <p:set>
+                                      <p:cBhvr>
+                                        <p:cTn id="10" dur="1" fill="hold">
+                                          <p:stCondLst>
+                                            <p:cond delay="0"/>
+                                          </p:stCondLst>
+                                        </p:cTn>
+                                        <p:tgtEl>
+                                          <p:spTgt spid="8"/>
+                                        </p:tgtEl>
+                                        <p:attrNameLst>
+                                          <p:attrName>style.visibility</p:attrName>
+                                        </p:attrNameLst>
+                                      </p:cBhvr>
+                                      <p:to>
+                                        <p:strVal val="visible"/>
+                                      </p:to>
+                                    </p:set>
+                                  </p:childTnLst>
+                                </p:cTn>
+                              </p:par>
+                              <p:par>
+                                <p:cTn id="11" presetID="1" presetClass="entr" presetSubtype="0" fill="hold" grpId="0" nodeType="withEffect">
+                                  <p:stCondLst>
+                                    <p:cond delay="0"/>
+                                  </p:stCondLst>
+                                  <p:childTnLst>
+                                    <p:set>
+                                      <p:cBhvr>
+                                        <p:cTn id="12" dur="1" fill="hold">
+                                          <p:stCondLst>
+                                            <p:cond delay="0"/>
+                                          </p:stCondLst>
+                                        </p:cTn>
+                                        <p:tgtEl>
+                                          <p:spTgt spid="13"/>
+                                        </p:tgtEl>
+                                        <p:attrNameLst>
+                                          <p:attrName>style.visibility</p:attrName>
+                                        </p:attrNameLst>
+                                      </p:cBhvr>
+                                      <p:to>
+                                        <p:strVal val="visible"/>
+                                      </p:to>
+                                    </p:set>
+                                  </p:childTnLst>
+                                </p:cTn>
+                              </p:par>
+                            </p:childTnLst>
+                          </p:cTn>
+                        </p:par>
+                      </p:childTnLst>
+                    </p:cTn>
+                  </p:par>
+                </p:childTnLst>
+              </p:cTn>
+              <p:prevCondLst>
+                <p:cond evt="onPrev" delay="0">
+                  <p:tgtEl>
+                    <p:sldTgt/>
+                  </p:tgtEl>
+                </p:cond>
+              </p:prevCondLst>
+              <p:nextCondLst>
+                <p:cond evt="onNext" delay="0">
+                  <p:tgtEl>
+                    <p:sldTgt/>
+                  </p:tgtEl>
+                </p:cond>
+              </p:nextCondLst>
+            </p:seq>
+          </p:childTnLst>
+        </p:cTn>
       </p:par>
     </p:tnLst>
+    <p:bldLst>
+      <p:bldP spid="13" grpId="0"/>
+    </p:bldLst>
   </p:timing>
 </p:sld>
 </file>
 
-<file path=ppt/slides/slide8.xml><?xml version="1.0" encoding="utf-8"?>
+<file path=ppt/slides/slide7.xml><?xml version="1.0" encoding="utf-8"?>
 <p:sld xmlns:a="http://schemas.openxmlformats.org/drawingml/2006/main" xmlns:r="http://schemas.openxmlformats.org/officeDocument/2006/relationships" xmlns:p="http://schemas.openxmlformats.org/presentationml/2006/main">
   <p:cSld>
     <p:spTree>
@@ -8403,7 +8227,7 @@
 </p:sld>
 </file>
 
-<file path=ppt/slides/slide9.xml><?xml version="1.0" encoding="utf-8"?>
+<file path=ppt/slides/slide8.xml><?xml version="1.0" encoding="utf-8"?>
 <p:sld xmlns:a="http://schemas.openxmlformats.org/drawingml/2006/main" xmlns:r="http://schemas.openxmlformats.org/officeDocument/2006/relationships" xmlns:p="http://schemas.openxmlformats.org/presentationml/2006/main">
   <p:cSld>
     <p:spTree>
@@ -8830,6 +8654,427 @@
 </p:sld>
 </file>
 
+<file path=ppt/slides/slide9.xml><?xml version="1.0" encoding="utf-8"?>
+<p:sld xmlns:a="http://schemas.openxmlformats.org/drawingml/2006/main" xmlns:r="http://schemas.openxmlformats.org/officeDocument/2006/relationships" xmlns:p="http://schemas.openxmlformats.org/presentationml/2006/main">
+  <p:cSld>
+    <p:spTree>
+      <p:nvGrpSpPr>
+        <p:cNvPr id="1" name=""/>
+        <p:cNvGrpSpPr/>
+        <p:nvPr/>
+      </p:nvGrpSpPr>
+      <p:grpSpPr>
+        <a:xfrm>
+          <a:off x="0" y="0"/>
+          <a:ext cx="0" cy="0"/>
+          <a:chOff x="0" y="0"/>
+          <a:chExt cx="0" cy="0"/>
+        </a:xfrm>
+      </p:grpSpPr>
+      <p:sp>
+        <p:nvSpPr>
+          <p:cNvPr id="4" name="Titre 1"/>
+          <p:cNvSpPr txBox="1">
+            <a:spLocks/>
+          </p:cNvSpPr>
+          <p:nvPr/>
+        </p:nvSpPr>
+        <p:spPr>
+          <a:xfrm>
+            <a:off x="0" y="0"/>
+            <a:ext cx="12192000" cy="747252"/>
+          </a:xfrm>
+          <a:prstGeom prst="rect">
+            <a:avLst/>
+          </a:prstGeom>
+        </p:spPr>
+        <p:txBody>
+          <a:bodyPr vert="horz" lIns="91440" tIns="45720" rIns="91440" bIns="45720" rtlCol="0" anchor="ctr">
+            <a:normAutofit/>
+          </a:bodyPr>
+          <a:lstStyle>
+            <a:lvl1pPr algn="l" defTabSz="914400" rtl="0" eaLnBrk="1" latinLnBrk="0" hangingPunct="1">
+              <a:lnSpc>
+                <a:spcPct val="90000"/>
+              </a:lnSpc>
+              <a:spcBef>
+                <a:spcPct val="0"/>
+              </a:spcBef>
+              <a:buNone/>
+              <a:defRPr sz="4400" kern="1200">
+                <a:solidFill>
+                  <a:schemeClr val="tx1"/>
+                </a:solidFill>
+                <a:latin typeface="+mj-lt"/>
+                <a:ea typeface="+mj-ea"/>
+                <a:cs typeface="+mj-cs"/>
+              </a:defRPr>
+            </a:lvl1pPr>
+          </a:lstStyle>
+          <a:p>
+            <a:r>
+              <a:rPr lang="fr-FR" sz="3600" b="1" dirty="0" smtClean="0">
+                <a:solidFill>
+                  <a:srgbClr val="0070C0"/>
+                </a:solidFill>
+              </a:rPr>
+              <a:t>  Synthèse du paracétamol – Montage</a:t>
+            </a:r>
+            <a:endParaRPr lang="fr-FR" sz="3600" dirty="0">
+              <a:solidFill>
+                <a:srgbClr val="0070C0"/>
+              </a:solidFill>
+            </a:endParaRPr>
+          </a:p>
+        </p:txBody>
+      </p:sp>
+      <p:cxnSp>
+        <p:nvCxnSpPr>
+          <p:cNvPr id="5" name="Connecteur droit 4"/>
+          <p:cNvCxnSpPr/>
+          <p:nvPr/>
+        </p:nvCxnSpPr>
+        <p:spPr>
+          <a:xfrm>
+            <a:off x="220983" y="747252"/>
+            <a:ext cx="11754707" cy="0"/>
+          </a:xfrm>
+          <a:prstGeom prst="line">
+            <a:avLst/>
+          </a:prstGeom>
+          <a:ln w="76200">
+            <a:gradFill flip="none" rotWithShape="1">
+              <a:gsLst>
+                <a:gs pos="0">
+                  <a:srgbClr val="0070C0"/>
+                </a:gs>
+                <a:gs pos="100000">
+                  <a:srgbClr val="0070C0">
+                    <a:alpha val="25000"/>
+                  </a:srgbClr>
+                </a:gs>
+              </a:gsLst>
+              <a:lin ang="0" scaled="1"/>
+              <a:tileRect/>
+            </a:gradFill>
+          </a:ln>
+        </p:spPr>
+        <p:style>
+          <a:lnRef idx="1">
+            <a:schemeClr val="accent1"/>
+          </a:lnRef>
+          <a:fillRef idx="0">
+            <a:schemeClr val="accent1"/>
+          </a:fillRef>
+          <a:effectRef idx="0">
+            <a:schemeClr val="accent1"/>
+          </a:effectRef>
+          <a:fontRef idx="minor">
+            <a:schemeClr val="tx1"/>
+          </a:fontRef>
+        </p:style>
+      </p:cxnSp>
+      <p:grpSp>
+        <p:nvGrpSpPr>
+          <p:cNvPr id="3" name="Groupe 2"/>
+          <p:cNvGrpSpPr/>
+          <p:nvPr/>
+        </p:nvGrpSpPr>
+        <p:grpSpPr>
+          <a:xfrm>
+            <a:off x="220982" y="990072"/>
+            <a:ext cx="6562846" cy="5058137"/>
+            <a:chOff x="2814577" y="1203767"/>
+            <a:chExt cx="6562846" cy="5058137"/>
+          </a:xfrm>
+        </p:grpSpPr>
+        <p:pic>
+          <p:nvPicPr>
+            <p:cNvPr id="20" name="Image 19"/>
+            <p:cNvPicPr>
+              <a:picLocks noChangeAspect="1"/>
+            </p:cNvPicPr>
+            <p:nvPr/>
+          </p:nvPicPr>
+          <p:blipFill rotWithShape="1">
+            <a:blip r:embed="rId2"/>
+            <a:srcRect l="22404" t="17385" r="23766" b="8860"/>
+            <a:stretch/>
+          </p:blipFill>
+          <p:spPr>
+            <a:xfrm>
+              <a:off x="2814577" y="1203767"/>
+              <a:ext cx="6562846" cy="5058137"/>
+            </a:xfrm>
+            <a:prstGeom prst="rect">
+              <a:avLst/>
+            </a:prstGeom>
+          </p:spPr>
+        </p:pic>
+        <p:sp>
+          <p:nvSpPr>
+            <p:cNvPr id="2" name="Rectangle 1"/>
+            <p:cNvSpPr/>
+            <p:nvPr/>
+          </p:nvSpPr>
+          <p:spPr>
+            <a:xfrm>
+              <a:off x="6991109" y="1203767"/>
+              <a:ext cx="2386314" cy="2187616"/>
+            </a:xfrm>
+            <a:prstGeom prst="rect">
+              <a:avLst/>
+            </a:prstGeom>
+            <a:solidFill>
+              <a:schemeClr val="bg1"/>
+            </a:solidFill>
+            <a:ln>
+              <a:noFill/>
+            </a:ln>
+          </p:spPr>
+          <p:style>
+            <a:lnRef idx="2">
+              <a:schemeClr val="accent1">
+                <a:shade val="50000"/>
+              </a:schemeClr>
+            </a:lnRef>
+            <a:fillRef idx="1">
+              <a:schemeClr val="accent1"/>
+            </a:fillRef>
+            <a:effectRef idx="0">
+              <a:schemeClr val="accent1"/>
+            </a:effectRef>
+            <a:fontRef idx="minor">
+              <a:schemeClr val="lt1"/>
+            </a:fontRef>
+          </p:style>
+          <p:txBody>
+            <a:bodyPr rtlCol="0" anchor="ctr"/>
+            <a:lstStyle/>
+            <a:p>
+              <a:pPr algn="ctr"/>
+              <a:endParaRPr lang="fr-FR"/>
+            </a:p>
+          </p:txBody>
+        </p:sp>
+      </p:grpSp>
+      <p:pic>
+        <p:nvPicPr>
+          <p:cNvPr id="6" name="Image 5"/>
+          <p:cNvPicPr>
+            <a:picLocks noChangeAspect="1"/>
+          </p:cNvPicPr>
+          <p:nvPr/>
+        </p:nvPicPr>
+        <p:blipFill rotWithShape="1">
+          <a:blip r:embed="rId3"/>
+          <a:srcRect l="15570" t="12489" r="51581" b="5822"/>
+          <a:stretch/>
+        </p:blipFill>
+        <p:spPr>
+          <a:xfrm>
+            <a:off x="8777609" y="1574593"/>
+            <a:ext cx="3198081" cy="4473616"/>
+          </a:xfrm>
+          <a:prstGeom prst="rect">
+            <a:avLst/>
+          </a:prstGeom>
+        </p:spPr>
+      </p:pic>
+      <p:sp>
+        <p:nvSpPr>
+          <p:cNvPr id="21" name="Rectangle 20"/>
+          <p:cNvSpPr/>
+          <p:nvPr/>
+        </p:nvSpPr>
+        <p:spPr>
+          <a:xfrm>
+            <a:off x="1657496" y="6291031"/>
+            <a:ext cx="3689819" cy="523220"/>
+          </a:xfrm>
+          <a:prstGeom prst="rect">
+            <a:avLst/>
+          </a:prstGeom>
+        </p:spPr>
+        <p:txBody>
+          <a:bodyPr wrap="square">
+            <a:spAutoFit/>
+          </a:bodyPr>
+          <a:lstStyle/>
+          <a:p>
+            <a:pPr algn="ctr"/>
+            <a:r>
+              <a:rPr lang="fr-FR" sz="2800" dirty="0" smtClean="0">
+                <a:solidFill>
+                  <a:schemeClr val="accent2"/>
+                </a:solidFill>
+              </a:rPr>
+              <a:t>Chauffage à reflux</a:t>
+            </a:r>
+            <a:endParaRPr lang="fr-FR" sz="2800" dirty="0">
+              <a:solidFill>
+                <a:schemeClr val="accent2"/>
+              </a:solidFill>
+            </a:endParaRPr>
+          </a:p>
+        </p:txBody>
+      </p:sp>
+      <p:sp>
+        <p:nvSpPr>
+          <p:cNvPr id="22" name="Rectangle 21"/>
+          <p:cNvSpPr/>
+          <p:nvPr/>
+        </p:nvSpPr>
+        <p:spPr>
+          <a:xfrm>
+            <a:off x="8531739" y="6291031"/>
+            <a:ext cx="3689819" cy="523220"/>
+          </a:xfrm>
+          <a:prstGeom prst="rect">
+            <a:avLst/>
+          </a:prstGeom>
+        </p:spPr>
+        <p:txBody>
+          <a:bodyPr wrap="square">
+            <a:spAutoFit/>
+          </a:bodyPr>
+          <a:lstStyle/>
+          <a:p>
+            <a:pPr algn="ctr"/>
+            <a:r>
+              <a:rPr lang="fr-FR" sz="2800" dirty="0" smtClean="0">
+                <a:solidFill>
+                  <a:schemeClr val="accent2"/>
+                </a:solidFill>
+              </a:rPr>
+              <a:t>Filtrage sous vide</a:t>
+            </a:r>
+            <a:endParaRPr lang="fr-FR" sz="2800" dirty="0">
+              <a:solidFill>
+                <a:schemeClr val="accent2"/>
+              </a:solidFill>
+            </a:endParaRPr>
+          </a:p>
+        </p:txBody>
+      </p:sp>
+    </p:spTree>
+    <p:extLst>
+      <p:ext uri="{BB962C8B-B14F-4D97-AF65-F5344CB8AC3E}">
+        <p14:creationId xmlns:p14="http://schemas.microsoft.com/office/powerpoint/2010/main" val="667187494"/>
+      </p:ext>
+    </p:extLst>
+  </p:cSld>
+  <p:clrMapOvr>
+    <a:masterClrMapping/>
+  </p:clrMapOvr>
+  <p:timing>
+    <p:tnLst>
+      <p:par>
+        <p:cTn id="1" dur="indefinite" restart="never" nodeType="tmRoot">
+          <p:childTnLst>
+            <p:seq concurrent="1" nextAc="seek">
+              <p:cTn id="2" dur="indefinite" nodeType="mainSeq">
+                <p:childTnLst>
+                  <p:par>
+                    <p:cTn id="3" fill="hold">
+                      <p:stCondLst>
+                        <p:cond delay="indefinite"/>
+                      </p:stCondLst>
+                      <p:childTnLst>
+                        <p:par>
+                          <p:cTn id="4" fill="hold">
+                            <p:stCondLst>
+                              <p:cond delay="0"/>
+                            </p:stCondLst>
+                            <p:childTnLst>
+                              <p:par>
+                                <p:cTn id="5" presetID="1" presetClass="entr" presetSubtype="0" fill="hold" nodeType="clickEffect">
+                                  <p:stCondLst>
+                                    <p:cond delay="0"/>
+                                  </p:stCondLst>
+                                  <p:childTnLst>
+                                    <p:set>
+                                      <p:cBhvr>
+                                        <p:cTn id="6" dur="1" fill="hold">
+                                          <p:stCondLst>
+                                            <p:cond delay="0"/>
+                                          </p:stCondLst>
+                                        </p:cTn>
+                                        <p:tgtEl>
+                                          <p:spTgt spid="6"/>
+                                        </p:tgtEl>
+                                        <p:attrNameLst>
+                                          <p:attrName>style.visibility</p:attrName>
+                                        </p:attrNameLst>
+                                      </p:cBhvr>
+                                      <p:to>
+                                        <p:strVal val="visible"/>
+                                      </p:to>
+                                    </p:set>
+                                  </p:childTnLst>
+                                </p:cTn>
+                              </p:par>
+                              <p:par>
+                                <p:cTn id="7" presetID="1" presetClass="entr" presetSubtype="0" fill="hold" grpId="0" nodeType="withEffect">
+                                  <p:stCondLst>
+                                    <p:cond delay="0"/>
+                                  </p:stCondLst>
+                                  <p:childTnLst>
+                                    <p:set>
+                                      <p:cBhvr>
+                                        <p:cTn id="8" dur="1" fill="hold">
+                                          <p:stCondLst>
+                                            <p:cond delay="0"/>
+                                          </p:stCondLst>
+                                        </p:cTn>
+                                        <p:tgtEl>
+                                          <p:spTgt spid="22"/>
+                                        </p:tgtEl>
+                                        <p:attrNameLst>
+                                          <p:attrName>style.visibility</p:attrName>
+                                        </p:attrNameLst>
+                                      </p:cBhvr>
+                                      <p:to>
+                                        <p:strVal val="visible"/>
+                                      </p:to>
+                                    </p:set>
+                                  </p:childTnLst>
+                                </p:cTn>
+                              </p:par>
+                            </p:childTnLst>
+                          </p:cTn>
+                        </p:par>
+                      </p:childTnLst>
+                    </p:cTn>
+                  </p:par>
+                </p:childTnLst>
+              </p:cTn>
+              <p:prevCondLst>
+                <p:cond evt="onPrev" delay="0">
+                  <p:tgtEl>
+                    <p:sldTgt/>
+                  </p:tgtEl>
+                </p:cond>
+              </p:prevCondLst>
+              <p:nextCondLst>
+                <p:cond evt="onNext" delay="0">
+                  <p:tgtEl>
+                    <p:sldTgt/>
+                  </p:tgtEl>
+                </p:cond>
+              </p:nextCondLst>
+            </p:seq>
+          </p:childTnLst>
+        </p:cTn>
+      </p:par>
+    </p:tnLst>
+    <p:bldLst>
+      <p:bldP spid="22" grpId="0"/>
+    </p:bldLst>
+  </p:timing>
+</p:sld>
+</file>
+
 <file path=ppt/theme/theme1.xml><?xml version="1.0" encoding="utf-8"?>
 <a:theme xmlns:a="http://schemas.openxmlformats.org/drawingml/2006/main" name="Thème Office">
   <a:themeElements>

</xml_diff>